<commit_message>
implementation of only alpha_fixé_H0_Omegam in 'Mesure uniquement' + modification of some program in 'restraining parameters'
</commit_message>
<xml_diff>
--- a/2-modèle G modifié/calibration/Récapitulatif chi2,HD,résidus.pptx
+++ b/2-modèle G modifié/calibration/Récapitulatif chi2,HD,résidus.pptx
@@ -7,20 +7,21 @@
   <p:sldIdLst>
     <p:sldId id="256" r:id="rId2"/>
     <p:sldId id="257" r:id="rId3"/>
-    <p:sldId id="258" r:id="rId4"/>
+    <p:sldId id="272" r:id="rId4"/>
     <p:sldId id="259" r:id="rId5"/>
-    <p:sldId id="260" r:id="rId6"/>
-    <p:sldId id="261" r:id="rId7"/>
-    <p:sldId id="262" r:id="rId8"/>
-    <p:sldId id="263" r:id="rId9"/>
-    <p:sldId id="264" r:id="rId10"/>
-    <p:sldId id="265" r:id="rId11"/>
-    <p:sldId id="266" r:id="rId12"/>
-    <p:sldId id="267" r:id="rId13"/>
-    <p:sldId id="268" r:id="rId14"/>
-    <p:sldId id="269" r:id="rId15"/>
-    <p:sldId id="270" r:id="rId16"/>
-    <p:sldId id="271" r:id="rId17"/>
+    <p:sldId id="258" r:id="rId6"/>
+    <p:sldId id="260" r:id="rId7"/>
+    <p:sldId id="261" r:id="rId8"/>
+    <p:sldId id="262" r:id="rId9"/>
+    <p:sldId id="263" r:id="rId10"/>
+    <p:sldId id="264" r:id="rId11"/>
+    <p:sldId id="265" r:id="rId12"/>
+    <p:sldId id="266" r:id="rId13"/>
+    <p:sldId id="267" r:id="rId14"/>
+    <p:sldId id="268" r:id="rId15"/>
+    <p:sldId id="269" r:id="rId16"/>
+    <p:sldId id="270" r:id="rId17"/>
+    <p:sldId id="271" r:id="rId18"/>
   </p:sldIdLst>
   <p:sldSz cx="12192000" cy="6858000"/>
   <p:notesSz cx="6858000" cy="9144000"/>
@@ -258,7 +259,7 @@
           <a:p>
             <a:fld id="{9EDA7628-4F50-44B5-B4B4-79DB92203161}" type="datetimeFigureOut">
               <a:rPr lang="fr-FR" smtClean="0"/>
-              <a:t>15/01/2024</a:t>
+              <a:t>17/01/2024</a:t>
             </a:fld>
             <a:endParaRPr lang="fr-FR"/>
           </a:p>
@@ -428,7 +429,7 @@
           <a:p>
             <a:fld id="{9EDA7628-4F50-44B5-B4B4-79DB92203161}" type="datetimeFigureOut">
               <a:rPr lang="fr-FR" smtClean="0"/>
-              <a:t>15/01/2024</a:t>
+              <a:t>17/01/2024</a:t>
             </a:fld>
             <a:endParaRPr lang="fr-FR"/>
           </a:p>
@@ -608,7 +609,7 @@
           <a:p>
             <a:fld id="{9EDA7628-4F50-44B5-B4B4-79DB92203161}" type="datetimeFigureOut">
               <a:rPr lang="fr-FR" smtClean="0"/>
-              <a:t>15/01/2024</a:t>
+              <a:t>17/01/2024</a:t>
             </a:fld>
             <a:endParaRPr lang="fr-FR"/>
           </a:p>
@@ -778,7 +779,7 @@
           <a:p>
             <a:fld id="{9EDA7628-4F50-44B5-B4B4-79DB92203161}" type="datetimeFigureOut">
               <a:rPr lang="fr-FR" smtClean="0"/>
-              <a:t>15/01/2024</a:t>
+              <a:t>17/01/2024</a:t>
             </a:fld>
             <a:endParaRPr lang="fr-FR"/>
           </a:p>
@@ -1024,7 +1025,7 @@
           <a:p>
             <a:fld id="{9EDA7628-4F50-44B5-B4B4-79DB92203161}" type="datetimeFigureOut">
               <a:rPr lang="fr-FR" smtClean="0"/>
-              <a:t>15/01/2024</a:t>
+              <a:t>17/01/2024</a:t>
             </a:fld>
             <a:endParaRPr lang="fr-FR"/>
           </a:p>
@@ -1256,7 +1257,7 @@
           <a:p>
             <a:fld id="{9EDA7628-4F50-44B5-B4B4-79DB92203161}" type="datetimeFigureOut">
               <a:rPr lang="fr-FR" smtClean="0"/>
-              <a:t>15/01/2024</a:t>
+              <a:t>17/01/2024</a:t>
             </a:fld>
             <a:endParaRPr lang="fr-FR"/>
           </a:p>
@@ -1623,7 +1624,7 @@
           <a:p>
             <a:fld id="{9EDA7628-4F50-44B5-B4B4-79DB92203161}" type="datetimeFigureOut">
               <a:rPr lang="fr-FR" smtClean="0"/>
-              <a:t>15/01/2024</a:t>
+              <a:t>17/01/2024</a:t>
             </a:fld>
             <a:endParaRPr lang="fr-FR"/>
           </a:p>
@@ -1741,7 +1742,7 @@
           <a:p>
             <a:fld id="{9EDA7628-4F50-44B5-B4B4-79DB92203161}" type="datetimeFigureOut">
               <a:rPr lang="fr-FR" smtClean="0"/>
-              <a:t>15/01/2024</a:t>
+              <a:t>17/01/2024</a:t>
             </a:fld>
             <a:endParaRPr lang="fr-FR"/>
           </a:p>
@@ -1836,7 +1837,7 @@
           <a:p>
             <a:fld id="{9EDA7628-4F50-44B5-B4B4-79DB92203161}" type="datetimeFigureOut">
               <a:rPr lang="fr-FR" smtClean="0"/>
-              <a:t>15/01/2024</a:t>
+              <a:t>17/01/2024</a:t>
             </a:fld>
             <a:endParaRPr lang="fr-FR"/>
           </a:p>
@@ -2113,7 +2114,7 @@
           <a:p>
             <a:fld id="{9EDA7628-4F50-44B5-B4B4-79DB92203161}" type="datetimeFigureOut">
               <a:rPr lang="fr-FR" smtClean="0"/>
-              <a:t>15/01/2024</a:t>
+              <a:t>17/01/2024</a:t>
             </a:fld>
             <a:endParaRPr lang="fr-FR"/>
           </a:p>
@@ -2370,7 +2371,7 @@
           <a:p>
             <a:fld id="{9EDA7628-4F50-44B5-B4B4-79DB92203161}" type="datetimeFigureOut">
               <a:rPr lang="fr-FR" smtClean="0"/>
-              <a:t>15/01/2024</a:t>
+              <a:t>17/01/2024</a:t>
             </a:fld>
             <a:endParaRPr lang="fr-FR"/>
           </a:p>
@@ -2583,7 +2584,7 @@
           <a:p>
             <a:fld id="{9EDA7628-4F50-44B5-B4B4-79DB92203161}" type="datetimeFigureOut">
               <a:rPr lang="fr-FR" smtClean="0"/>
-              <a:t>15/01/2024</a:t>
+              <a:t>17/01/2024</a:t>
             </a:fld>
             <a:endParaRPr lang="fr-FR"/>
           </a:p>
@@ -3048,6 +3049,148 @@
       </p:grpSpPr>
       <p:sp>
         <p:nvSpPr>
+          <p:cNvPr id="4" name="ZoneTexte 3">
+            <a:extLst>
+              <a:ext uri="{FF2B5EF4-FFF2-40B4-BE49-F238E27FC236}">
+                <a16:creationId xmlns:a16="http://schemas.microsoft.com/office/drawing/2014/main" id="{DAA4CF49-29C2-A11A-F917-BDF4025F4680}"/>
+              </a:ext>
+            </a:extLst>
+          </p:cNvPr>
+          <p:cNvSpPr txBox="1"/>
+          <p:nvPr/>
+        </p:nvSpPr>
+        <p:spPr>
+          <a:xfrm>
+            <a:off x="315685" y="498328"/>
+            <a:ext cx="11560629" cy="2585323"/>
+          </a:xfrm>
+          <a:prstGeom prst="rect">
+            <a:avLst/>
+          </a:prstGeom>
+          <a:noFill/>
+        </p:spPr>
+        <p:txBody>
+          <a:bodyPr wrap="square" rtlCol="0">
+            <a:spAutoFit/>
+          </a:bodyPr>
+          <a:lstStyle/>
+          <a:p>
+            <a:r>
+              <a:rPr lang="fr-FR" dirty="0"/>
+              <a:t>*Min AIC =</a:t>
+            </a:r>
+            <a:r>
+              <a:rPr lang="fr-FR" dirty="0">
+                <a:solidFill>
+                  <a:srgbClr val="FF0000"/>
+                </a:solidFill>
+              </a:rPr>
+              <a:t> 3789.44</a:t>
+            </a:r>
+            <a:r>
+              <a:rPr lang="fr-FR" dirty="0"/>
+              <a:t> (en même temps on ne fait qu’un seul calcul de </a:t>
+            </a:r>
+            <a:r>
+              <a:rPr lang="fr-FR" dirty="0" err="1"/>
+              <a:t>likelihood</a:t>
+            </a:r>
+            <a:r>
+              <a:rPr lang="fr-FR" dirty="0"/>
+              <a:t>…)</a:t>
+            </a:r>
+          </a:p>
+          <a:p>
+            <a:endParaRPr lang="fr-FR" dirty="0"/>
+          </a:p>
+          <a:p>
+            <a:endParaRPr lang="fr-FR" dirty="0"/>
+          </a:p>
+          <a:p>
+            <a:endParaRPr lang="fr-FR" dirty="0"/>
+          </a:p>
+          <a:p>
+            <a:endParaRPr lang="fr-FR" dirty="0"/>
+          </a:p>
+          <a:p>
+            <a:endParaRPr lang="fr-FR" dirty="0"/>
+          </a:p>
+          <a:p>
+            <a:endParaRPr lang="fr-FR" dirty="0"/>
+          </a:p>
+          <a:p>
+            <a:endParaRPr lang="fr-FR" dirty="0"/>
+          </a:p>
+          <a:p>
+            <a:r>
+              <a:rPr lang="fr-FR" dirty="0"/>
+              <a:t>		</a:t>
+            </a:r>
+          </a:p>
+        </p:txBody>
+      </p:sp>
+      <p:pic>
+        <p:nvPicPr>
+          <p:cNvPr id="3" name="Image 2">
+            <a:extLst>
+              <a:ext uri="{FF2B5EF4-FFF2-40B4-BE49-F238E27FC236}">
+                <a16:creationId xmlns:a16="http://schemas.microsoft.com/office/drawing/2014/main" id="{FCF62DA5-13A0-B657-23DD-50EAC5BC44B6}"/>
+              </a:ext>
+            </a:extLst>
+          </p:cNvPr>
+          <p:cNvPicPr>
+            <a:picLocks noChangeAspect="1"/>
+          </p:cNvPicPr>
+          <p:nvPr/>
+        </p:nvPicPr>
+        <p:blipFill>
+          <a:blip r:embed="rId2"/>
+          <a:stretch>
+            <a:fillRect/>
+          </a:stretch>
+        </p:blipFill>
+        <p:spPr>
+          <a:xfrm>
+            <a:off x="1119275" y="941344"/>
+            <a:ext cx="10195648" cy="5418328"/>
+          </a:xfrm>
+          <a:prstGeom prst="rect">
+            <a:avLst/>
+          </a:prstGeom>
+        </p:spPr>
+      </p:pic>
+    </p:spTree>
+    <p:extLst>
+      <p:ext uri="{BB962C8B-B14F-4D97-AF65-F5344CB8AC3E}">
+        <p14:creationId xmlns:p14="http://schemas.microsoft.com/office/powerpoint/2010/main" val="2638830444"/>
+      </p:ext>
+    </p:extLst>
+  </p:cSld>
+  <p:clrMapOvr>
+    <a:masterClrMapping/>
+  </p:clrMapOvr>
+</p:sld>
+</file>
+
+<file path=ppt/slides/slide11.xml><?xml version="1.0" encoding="utf-8"?>
+<p:sld xmlns:a="http://schemas.openxmlformats.org/drawingml/2006/main" xmlns:r="http://schemas.openxmlformats.org/officeDocument/2006/relationships" xmlns:p="http://schemas.openxmlformats.org/presentationml/2006/main">
+  <p:cSld>
+    <p:spTree>
+      <p:nvGrpSpPr>
+        <p:cNvPr id="1" name=""/>
+        <p:cNvGrpSpPr/>
+        <p:nvPr/>
+      </p:nvGrpSpPr>
+      <p:grpSpPr>
+        <a:xfrm>
+          <a:off x="0" y="0"/>
+          <a:ext cx="0" cy="0"/>
+          <a:chOff x="0" y="0"/>
+          <a:chExt cx="0" cy="0"/>
+        </a:xfrm>
+      </p:grpSpPr>
+      <p:sp>
+        <p:nvSpPr>
           <p:cNvPr id="2" name="Titre 1">
             <a:extLst>
               <a:ext uri="{FF2B5EF4-FFF2-40B4-BE49-F238E27FC236}">
@@ -3142,7 +3285,7 @@
 </p:sld>
 </file>
 
-<file path=ppt/slides/slide11.xml><?xml version="1.0" encoding="utf-8"?>
+<file path=ppt/slides/slide12.xml><?xml version="1.0" encoding="utf-8"?>
 <p:sld xmlns:a="http://schemas.openxmlformats.org/drawingml/2006/main" xmlns:r="http://schemas.openxmlformats.org/officeDocument/2006/relationships" xmlns:p="http://schemas.openxmlformats.org/presentationml/2006/main">
   <p:cSld>
     <p:spTree>
@@ -3183,14 +3326,30 @@
         </p:spPr>
         <p:txBody>
           <a:bodyPr>
-            <a:normAutofit/>
+            <a:normAutofit fontScale="90000"/>
           </a:bodyPr>
           <a:lstStyle/>
           <a:p>
             <a:pPr algn="l"/>
             <a:r>
               <a:rPr lang="fr-FR" sz="4800" dirty="0"/>
-              <a:t>*Luminosité intrinsèque modifiée</a:t>
+              <a:t>*Luminosité intrinsèque modifiée : (1+</a:t>
+            </a:r>
+            <a:r>
+              <a:rPr lang="el-GR" sz="4800" dirty="0"/>
+              <a:t>α</a:t>
+            </a:r>
+            <a:r>
+              <a:rPr lang="fr-FR" sz="4800" dirty="0"/>
+              <a:t>a) avec </a:t>
+            </a:r>
+            <a:r>
+              <a:rPr lang="el-GR" sz="4800" dirty="0"/>
+              <a:t>α</a:t>
+            </a:r>
+            <a:r>
+              <a:rPr lang="fr-FR" sz="4800" dirty="0"/>
+              <a:t> souhaité à 0,18 </a:t>
             </a:r>
             <a:br>
               <a:rPr lang="fr-FR" sz="4800" dirty="0"/>
@@ -3215,7 +3374,7 @@
 </p:sld>
 </file>
 
-<file path=ppt/slides/slide12.xml><?xml version="1.0" encoding="utf-8"?>
+<file path=ppt/slides/slide13.xml><?xml version="1.0" encoding="utf-8"?>
 <p:sld xmlns:a="http://schemas.openxmlformats.org/drawingml/2006/main" xmlns:r="http://schemas.openxmlformats.org/officeDocument/2006/relationships" xmlns:p="http://schemas.openxmlformats.org/presentationml/2006/main">
   <p:cSld>
     <p:spTree>
@@ -3354,7 +3513,7 @@
 </p:sld>
 </file>
 
-<file path=ppt/slides/slide13.xml><?xml version="1.0" encoding="utf-8"?>
+<file path=ppt/slides/slide14.xml><?xml version="1.0" encoding="utf-8"?>
 <p:sld xmlns:a="http://schemas.openxmlformats.org/drawingml/2006/main" xmlns:r="http://schemas.openxmlformats.org/officeDocument/2006/relationships" xmlns:p="http://schemas.openxmlformats.org/presentationml/2006/main">
   <p:cSld>
     <p:spTree>
@@ -3464,7 +3623,7 @@
 </p:sld>
 </file>
 
-<file path=ppt/slides/slide14.xml><?xml version="1.0" encoding="utf-8"?>
+<file path=ppt/slides/slide15.xml><?xml version="1.0" encoding="utf-8"?>
 <p:sld xmlns:a="http://schemas.openxmlformats.org/drawingml/2006/main" xmlns:r="http://schemas.openxmlformats.org/officeDocument/2006/relationships" xmlns:p="http://schemas.openxmlformats.org/presentationml/2006/main">
   <p:cSld>
     <p:spTree>
@@ -3578,7 +3737,7 @@
 </p:sld>
 </file>
 
-<file path=ppt/slides/slide15.xml><?xml version="1.0" encoding="utf-8"?>
+<file path=ppt/slides/slide16.xml><?xml version="1.0" encoding="utf-8"?>
 <p:sld xmlns:a="http://schemas.openxmlformats.org/drawingml/2006/main" xmlns:r="http://schemas.openxmlformats.org/officeDocument/2006/relationships" xmlns:p="http://schemas.openxmlformats.org/presentationml/2006/main">
   <p:cSld>
     <p:spTree>
@@ -3726,7 +3885,7 @@
 </p:sld>
 </file>
 
-<file path=ppt/slides/slide16.xml><?xml version="1.0" encoding="utf-8"?>
+<file path=ppt/slides/slide17.xml><?xml version="1.0" encoding="utf-8"?>
 <p:sld xmlns:a="http://schemas.openxmlformats.org/drawingml/2006/main" xmlns:r="http://schemas.openxmlformats.org/officeDocument/2006/relationships" xmlns:p="http://schemas.openxmlformats.org/presentationml/2006/main">
   <p:cSld>
     <p:spTree>
@@ -3956,12 +4115,92 @@
           <a:chExt cx="0" cy="0"/>
         </a:xfrm>
       </p:grpSpPr>
+      <p:sp>
+        <p:nvSpPr>
+          <p:cNvPr id="2" name="Titre 1">
+            <a:extLst>
+              <a:ext uri="{FF2B5EF4-FFF2-40B4-BE49-F238E27FC236}">
+                <a16:creationId xmlns:a16="http://schemas.microsoft.com/office/drawing/2014/main" id="{002D4734-D9D4-1482-CBDF-432668245285}"/>
+              </a:ext>
+            </a:extLst>
+          </p:cNvPr>
+          <p:cNvSpPr>
+            <a:spLocks noGrp="1"/>
+          </p:cNvSpPr>
+          <p:nvPr>
+            <p:ph type="title"/>
+          </p:nvPr>
+        </p:nvSpPr>
+        <p:spPr/>
+        <p:txBody>
+          <a:bodyPr/>
+          <a:lstStyle/>
+          <a:p>
+            <a:r>
+              <a:rPr lang="fr-FR" dirty="0"/>
+              <a:t>Unique calcul de Chi2 en reprenant les paramètres </a:t>
+            </a:r>
+            <a:r>
+              <a:rPr lang="fr-FR" dirty="0" err="1"/>
+              <a:t>optim</a:t>
+            </a:r>
+            <a:r>
+              <a:rPr lang="fr-FR" dirty="0"/>
+              <a:t> de Brout</a:t>
+            </a:r>
+          </a:p>
+        </p:txBody>
+      </p:sp>
+      <p:sp>
+        <p:nvSpPr>
+          <p:cNvPr id="4" name="ZoneTexte 3">
+            <a:extLst>
+              <a:ext uri="{FF2B5EF4-FFF2-40B4-BE49-F238E27FC236}">
+                <a16:creationId xmlns:a16="http://schemas.microsoft.com/office/drawing/2014/main" id="{491775F7-6FB6-2362-C679-FD2AFDAC6272}"/>
+              </a:ext>
+            </a:extLst>
+          </p:cNvPr>
+          <p:cNvSpPr txBox="1"/>
+          <p:nvPr/>
+        </p:nvSpPr>
+        <p:spPr>
+          <a:xfrm>
+            <a:off x="838200" y="1690688"/>
+            <a:ext cx="11560629" cy="369332"/>
+          </a:xfrm>
+          <a:prstGeom prst="rect">
+            <a:avLst/>
+          </a:prstGeom>
+          <a:noFill/>
+        </p:spPr>
+        <p:txBody>
+          <a:bodyPr wrap="square" rtlCol="0">
+            <a:spAutoFit/>
+          </a:bodyPr>
+          <a:lstStyle/>
+          <a:p>
+            <a:r>
+              <a:rPr lang="fr-FR" dirty="0"/>
+              <a:t>Min AIC =</a:t>
+            </a:r>
+            <a:r>
+              <a:rPr lang="fr-FR" dirty="0">
+                <a:solidFill>
+                  <a:srgbClr val="FF0000"/>
+                </a:solidFill>
+              </a:rPr>
+              <a:t> 1529</a:t>
+            </a:r>
+            <a:endParaRPr lang="fr-FR" dirty="0"/>
+          </a:p>
+        </p:txBody>
+      </p:sp>
       <p:pic>
         <p:nvPicPr>
           <p:cNvPr id="5" name="Image 4">
             <a:extLst>
               <a:ext uri="{FF2B5EF4-FFF2-40B4-BE49-F238E27FC236}">
-                <a16:creationId xmlns:a16="http://schemas.microsoft.com/office/drawing/2014/main" id="{C19F060E-A6BD-B279-C7A6-0A836DC14566}"/>
+                <a16:creationId xmlns:a16="http://schemas.microsoft.com/office/drawing/2014/main" id="{4BCEDA4F-084A-4F3F-5780-FF8FF34227DC}"/>
               </a:ext>
             </a:extLst>
           </p:cNvPr>
@@ -3972,83 +4211,6 @@
         </p:nvPicPr>
         <p:blipFill>
           <a:blip r:embed="rId2"/>
-          <a:stretch>
-            <a:fillRect/>
-          </a:stretch>
-        </p:blipFill>
-        <p:spPr>
-          <a:xfrm>
-            <a:off x="315685" y="782377"/>
-            <a:ext cx="11560629" cy="701589"/>
-          </a:xfrm>
-          <a:prstGeom prst="rect">
-            <a:avLst/>
-          </a:prstGeom>
-        </p:spPr>
-      </p:pic>
-      <p:sp>
-        <p:nvSpPr>
-          <p:cNvPr id="6" name="ZoneTexte 5">
-            <a:extLst>
-              <a:ext uri="{FF2B5EF4-FFF2-40B4-BE49-F238E27FC236}">
-                <a16:creationId xmlns:a16="http://schemas.microsoft.com/office/drawing/2014/main" id="{27F02283-53D4-08A5-6F71-73718FA3B036}"/>
-              </a:ext>
-            </a:extLst>
-          </p:cNvPr>
-          <p:cNvSpPr txBox="1"/>
-          <p:nvPr/>
-        </p:nvSpPr>
-        <p:spPr>
-          <a:xfrm>
-            <a:off x="315685" y="1670180"/>
-            <a:ext cx="11560629" cy="369332"/>
-          </a:xfrm>
-          <a:prstGeom prst="rect">
-            <a:avLst/>
-          </a:prstGeom>
-          <a:noFill/>
-        </p:spPr>
-        <p:txBody>
-          <a:bodyPr wrap="square" rtlCol="0">
-            <a:spAutoFit/>
-          </a:bodyPr>
-          <a:lstStyle/>
-          <a:p>
-            <a:r>
-              <a:rPr lang="fr-FR" dirty="0"/>
-              <a:t>Min AIC =</a:t>
-            </a:r>
-            <a:r>
-              <a:rPr lang="fr-FR" dirty="0">
-                <a:solidFill>
-                  <a:srgbClr val="FF0000"/>
-                </a:solidFill>
-              </a:rPr>
-              <a:t> 1527 </a:t>
-            </a:r>
-            <a:r>
-              <a:rPr lang="fr-FR" dirty="0"/>
-              <a:t>(on trouve ce résultat en essayant de retrouver les valeurs de param cosmo  : voir ↑)</a:t>
-            </a:r>
-          </a:p>
-        </p:txBody>
-      </p:sp>
-      <p:pic>
-        <p:nvPicPr>
-          <p:cNvPr id="10" name="Image 9">
-            <a:extLst>
-              <a:ext uri="{FF2B5EF4-FFF2-40B4-BE49-F238E27FC236}">
-                <a16:creationId xmlns:a16="http://schemas.microsoft.com/office/drawing/2014/main" id="{53E9E216-70CC-3013-74C2-39D1BF8E6964}"/>
-              </a:ext>
-            </a:extLst>
-          </p:cNvPr>
-          <p:cNvPicPr>
-            <a:picLocks noChangeAspect="1"/>
-          </p:cNvPicPr>
-          <p:nvPr/>
-        </p:nvPicPr>
-        <p:blipFill>
-          <a:blip r:embed="rId3"/>
           <a:stretch>
             <a:fillRect/>
           </a:stretch>
@@ -4066,7 +4228,7 @@
     </p:spTree>
     <p:extLst>
       <p:ext uri="{BB962C8B-B14F-4D97-AF65-F5344CB8AC3E}">
-        <p14:creationId xmlns:p14="http://schemas.microsoft.com/office/powerpoint/2010/main" val="1649893645"/>
+        <p14:creationId xmlns:p14="http://schemas.microsoft.com/office/powerpoint/2010/main" val="2733164656"/>
       </p:ext>
     </p:extLst>
   </p:cSld>
@@ -4244,6 +4406,175 @@
       </p:grpSpPr>
       <p:sp>
         <p:nvSpPr>
+          <p:cNvPr id="6" name="ZoneTexte 5">
+            <a:extLst>
+              <a:ext uri="{FF2B5EF4-FFF2-40B4-BE49-F238E27FC236}">
+                <a16:creationId xmlns:a16="http://schemas.microsoft.com/office/drawing/2014/main" id="{27F02283-53D4-08A5-6F71-73718FA3B036}"/>
+              </a:ext>
+            </a:extLst>
+          </p:cNvPr>
+          <p:cNvSpPr txBox="1"/>
+          <p:nvPr/>
+        </p:nvSpPr>
+        <p:spPr>
+          <a:xfrm>
+            <a:off x="440780" y="2878558"/>
+            <a:ext cx="11560629" cy="1200329"/>
+          </a:xfrm>
+          <a:prstGeom prst="rect">
+            <a:avLst/>
+          </a:prstGeom>
+          <a:noFill/>
+        </p:spPr>
+        <p:txBody>
+          <a:bodyPr wrap="square" rtlCol="0">
+            <a:spAutoFit/>
+          </a:bodyPr>
+          <a:lstStyle/>
+          <a:p>
+            <a:r>
+              <a:rPr lang="fr-FR" dirty="0"/>
+              <a:t>*2 premières lignes : Recherche de min de Chi2 en fixant 1 param (valeur Brout) et en faisant évoluer les deux autres (pas de condition </a:t>
+            </a:r>
+            <a:r>
+              <a:rPr lang="fr-FR" dirty="0" err="1"/>
+              <a:t>Omegam</a:t>
+            </a:r>
+            <a:r>
+              <a:rPr lang="fr-FR" dirty="0"/>
+              <a:t> = 1 – </a:t>
+            </a:r>
+            <a:r>
+              <a:rPr lang="fr-FR" dirty="0" err="1"/>
+              <a:t>OmegaL</a:t>
+            </a:r>
+            <a:r>
+              <a:rPr lang="fr-FR" dirty="0"/>
+              <a:t> imposé) → Min AIC =</a:t>
+            </a:r>
+            <a:r>
+              <a:rPr lang="fr-FR" dirty="0">
+                <a:solidFill>
+                  <a:srgbClr val="FF0000"/>
+                </a:solidFill>
+              </a:rPr>
+              <a:t> 1527</a:t>
+            </a:r>
+          </a:p>
+          <a:p>
+            <a:r>
+              <a:rPr lang="fr-FR" dirty="0"/>
+              <a:t>*2 dernières lignes : Recherche de min de Chi2 en fixant 1 param et en faisant évoluer 1 seul autre (en prenant en compte la condition </a:t>
+            </a:r>
+            <a:r>
+              <a:rPr lang="fr-FR" dirty="0" err="1"/>
+              <a:t>Omegam</a:t>
+            </a:r>
+            <a:r>
+              <a:rPr lang="fr-FR" dirty="0"/>
+              <a:t> = 1 – </a:t>
+            </a:r>
+            <a:r>
+              <a:rPr lang="fr-FR" dirty="0" err="1"/>
+              <a:t>OmegaL</a:t>
+            </a:r>
+            <a:r>
+              <a:rPr lang="fr-FR"/>
+              <a:t> ) </a:t>
+            </a:r>
+            <a:r>
+              <a:rPr lang="fr-FR" dirty="0"/>
+              <a:t>→ Min AIC = </a:t>
+            </a:r>
+            <a:r>
+              <a:rPr lang="fr-FR" dirty="0">
+                <a:solidFill>
+                  <a:srgbClr val="FF0000"/>
+                </a:solidFill>
+              </a:rPr>
+              <a:t>1525 ~ 1526 </a:t>
+            </a:r>
+            <a:r>
+              <a:rPr lang="fr-FR"/>
+              <a:t>(selon </a:t>
+            </a:r>
+            <a:r>
+              <a:rPr lang="fr-FR" dirty="0"/>
+              <a:t>que l’on fasse évoluer </a:t>
+            </a:r>
+            <a:r>
+              <a:rPr lang="fr-FR" dirty="0" err="1"/>
+              <a:t>Omegam</a:t>
+            </a:r>
+            <a:r>
+              <a:rPr lang="fr-FR" dirty="0"/>
+              <a:t> ou H0)</a:t>
+            </a:r>
+          </a:p>
+        </p:txBody>
+      </p:sp>
+      <p:pic>
+        <p:nvPicPr>
+          <p:cNvPr id="11" name="Image 10">
+            <a:extLst>
+              <a:ext uri="{FF2B5EF4-FFF2-40B4-BE49-F238E27FC236}">
+                <a16:creationId xmlns:a16="http://schemas.microsoft.com/office/drawing/2014/main" id="{E1EF5E86-38F2-D7E4-FEEA-E46BB02A20FA}"/>
+              </a:ext>
+            </a:extLst>
+          </p:cNvPr>
+          <p:cNvPicPr>
+            <a:picLocks noChangeAspect="1"/>
+          </p:cNvPicPr>
+          <p:nvPr/>
+        </p:nvPicPr>
+        <p:blipFill>
+          <a:blip r:embed="rId2"/>
+          <a:stretch>
+            <a:fillRect/>
+          </a:stretch>
+        </p:blipFill>
+        <p:spPr>
+          <a:xfrm>
+            <a:off x="263236" y="1339055"/>
+            <a:ext cx="11665527" cy="920425"/>
+          </a:xfrm>
+          <a:prstGeom prst="rect">
+            <a:avLst/>
+          </a:prstGeom>
+        </p:spPr>
+      </p:pic>
+    </p:spTree>
+    <p:extLst>
+      <p:ext uri="{BB962C8B-B14F-4D97-AF65-F5344CB8AC3E}">
+        <p14:creationId xmlns:p14="http://schemas.microsoft.com/office/powerpoint/2010/main" val="1649893645"/>
+      </p:ext>
+    </p:extLst>
+  </p:cSld>
+  <p:clrMapOvr>
+    <a:masterClrMapping/>
+  </p:clrMapOvr>
+</p:sld>
+</file>
+
+<file path=ppt/slides/slide6.xml><?xml version="1.0" encoding="utf-8"?>
+<p:sld xmlns:a="http://schemas.openxmlformats.org/drawingml/2006/main" xmlns:r="http://schemas.openxmlformats.org/officeDocument/2006/relationships" xmlns:p="http://schemas.openxmlformats.org/presentationml/2006/main">
+  <p:cSld>
+    <p:spTree>
+      <p:nvGrpSpPr>
+        <p:cNvPr id="1" name=""/>
+        <p:cNvGrpSpPr/>
+        <p:nvPr/>
+      </p:nvGrpSpPr>
+      <p:grpSpPr>
+        <a:xfrm>
+          <a:off x="0" y="0"/>
+          <a:ext cx="0" cy="0"/>
+          <a:chOff x="0" y="0"/>
+          <a:chExt cx="0" cy="0"/>
+        </a:xfrm>
+      </p:grpSpPr>
+      <p:sp>
+        <p:nvSpPr>
           <p:cNvPr id="4" name="Titre 1">
             <a:extLst>
               <a:ext uri="{FF2B5EF4-FFF2-40B4-BE49-F238E27FC236}">
@@ -4315,7 +4646,7 @@
 </p:sld>
 </file>
 
-<file path=ppt/slides/slide6.xml><?xml version="1.0" encoding="utf-8"?>
+<file path=ppt/slides/slide7.xml><?xml version="1.0" encoding="utf-8"?>
 <p:sld xmlns:a="http://schemas.openxmlformats.org/drawingml/2006/main" xmlns:r="http://schemas.openxmlformats.org/officeDocument/2006/relationships" xmlns:p="http://schemas.openxmlformats.org/presentationml/2006/main">
   <p:cSld>
     <p:spTree>
@@ -4481,7 +4812,7 @@
 </p:sld>
 </file>
 
-<file path=ppt/slides/slide7.xml><?xml version="1.0" encoding="utf-8"?>
+<file path=ppt/slides/slide8.xml><?xml version="1.0" encoding="utf-8"?>
 <p:sld xmlns:a="http://schemas.openxmlformats.org/drawingml/2006/main" xmlns:r="http://schemas.openxmlformats.org/officeDocument/2006/relationships" xmlns:p="http://schemas.openxmlformats.org/presentationml/2006/main">
   <p:cSld>
     <p:spTree>
@@ -4626,120 +4957,6 @@
 </p:sld>
 </file>
 
-<file path=ppt/slides/slide8.xml><?xml version="1.0" encoding="utf-8"?>
-<p:sld xmlns:a="http://schemas.openxmlformats.org/drawingml/2006/main" xmlns:r="http://schemas.openxmlformats.org/officeDocument/2006/relationships" xmlns:p="http://schemas.openxmlformats.org/presentationml/2006/main">
-  <p:cSld>
-    <p:spTree>
-      <p:nvGrpSpPr>
-        <p:cNvPr id="1" name=""/>
-        <p:cNvGrpSpPr/>
-        <p:nvPr/>
-      </p:nvGrpSpPr>
-      <p:grpSpPr>
-        <a:xfrm>
-          <a:off x="0" y="0"/>
-          <a:ext cx="0" cy="0"/>
-          <a:chOff x="0" y="0"/>
-          <a:chExt cx="0" cy="0"/>
-        </a:xfrm>
-      </p:grpSpPr>
-      <p:sp>
-        <p:nvSpPr>
-          <p:cNvPr id="3" name="Sous-titre 2">
-            <a:extLst>
-              <a:ext uri="{FF2B5EF4-FFF2-40B4-BE49-F238E27FC236}">
-                <a16:creationId xmlns:a16="http://schemas.microsoft.com/office/drawing/2014/main" id="{3B7FA202-5AE7-77BD-9CF2-4AAD068C77D7}"/>
-              </a:ext>
-            </a:extLst>
-          </p:cNvPr>
-          <p:cNvSpPr>
-            <a:spLocks noGrp="1"/>
-          </p:cNvSpPr>
-          <p:nvPr>
-            <p:ph type="subTitle" idx="1"/>
-          </p:nvPr>
-        </p:nvSpPr>
-        <p:spPr/>
-        <p:txBody>
-          <a:bodyPr/>
-          <a:lstStyle/>
-          <a:p>
-            <a:endParaRPr lang="fr-FR"/>
-          </a:p>
-        </p:txBody>
-      </p:sp>
-      <p:sp>
-        <p:nvSpPr>
-          <p:cNvPr id="4" name="Titre 1">
-            <a:extLst>
-              <a:ext uri="{FF2B5EF4-FFF2-40B4-BE49-F238E27FC236}">
-                <a16:creationId xmlns:a16="http://schemas.microsoft.com/office/drawing/2014/main" id="{52A1108C-5128-8BB8-4B8B-F5C36EDF8E66}"/>
-              </a:ext>
-            </a:extLst>
-          </p:cNvPr>
-          <p:cNvSpPr>
-            <a:spLocks noGrp="1"/>
-          </p:cNvSpPr>
-          <p:nvPr>
-            <p:ph type="ctrTitle"/>
-          </p:nvPr>
-        </p:nvSpPr>
-        <p:spPr>
-          <a:xfrm>
-            <a:off x="1524000" y="1713679"/>
-            <a:ext cx="10327689" cy="1780635"/>
-          </a:xfrm>
-        </p:spPr>
-        <p:txBody>
-          <a:bodyPr>
-            <a:normAutofit fontScale="90000"/>
-          </a:bodyPr>
-          <a:lstStyle/>
-          <a:p>
-            <a:pPr algn="l"/>
-            <a:r>
-              <a:rPr lang="fr-FR" sz="4800" dirty="0"/>
-              <a:t>*Luminosité intrinsèque inchangée</a:t>
-            </a:r>
-            <a:br>
-              <a:rPr lang="fr-FR" sz="4800" dirty="0"/>
-            </a:br>
-            <a:r>
-              <a:rPr lang="fr-FR" sz="4800" dirty="0"/>
-              <a:t>*Flat LCDM modifié : (1+</a:t>
-            </a:r>
-            <a:r>
-              <a:rPr lang="el-GR" sz="4800" dirty="0"/>
-              <a:t>α</a:t>
-            </a:r>
-            <a:r>
-              <a:rPr lang="fr-FR" sz="4800" dirty="0"/>
-              <a:t>a) avec </a:t>
-            </a:r>
-            <a:r>
-              <a:rPr lang="el-GR" sz="4800" dirty="0"/>
-              <a:t>α</a:t>
-            </a:r>
-            <a:r>
-              <a:rPr lang="fr-FR" sz="4800" dirty="0"/>
-              <a:t> souhaité à 0,18 </a:t>
-            </a:r>
-          </a:p>
-        </p:txBody>
-      </p:sp>
-    </p:spTree>
-    <p:extLst>
-      <p:ext uri="{BB962C8B-B14F-4D97-AF65-F5344CB8AC3E}">
-        <p14:creationId xmlns:p14="http://schemas.microsoft.com/office/powerpoint/2010/main" val="851162848"/>
-      </p:ext>
-    </p:extLst>
-  </p:cSld>
-  <p:clrMapOvr>
-    <a:masterClrMapping/>
-  </p:clrMapOvr>
-</p:sld>
-</file>
-
 <file path=ppt/slides/slide9.xml><?xml version="1.0" encoding="utf-8"?>
 <p:sld xmlns:a="http://schemas.openxmlformats.org/drawingml/2006/main" xmlns:r="http://schemas.openxmlformats.org/officeDocument/2006/relationships" xmlns:p="http://schemas.openxmlformats.org/presentationml/2006/main">
   <p:cSld>
@@ -4759,120 +4976,92 @@
       </p:grpSpPr>
       <p:sp>
         <p:nvSpPr>
-          <p:cNvPr id="4" name="ZoneTexte 3">
+          <p:cNvPr id="3" name="Sous-titre 2">
             <a:extLst>
               <a:ext uri="{FF2B5EF4-FFF2-40B4-BE49-F238E27FC236}">
-                <a16:creationId xmlns:a16="http://schemas.microsoft.com/office/drawing/2014/main" id="{DAA4CF49-29C2-A11A-F917-BDF4025F4680}"/>
+                <a16:creationId xmlns:a16="http://schemas.microsoft.com/office/drawing/2014/main" id="{3B7FA202-5AE7-77BD-9CF2-4AAD068C77D7}"/>
               </a:ext>
             </a:extLst>
           </p:cNvPr>
-          <p:cNvSpPr txBox="1"/>
-          <p:nvPr/>
-        </p:nvSpPr>
-        <p:spPr>
-          <a:xfrm>
-            <a:off x="315685" y="498328"/>
-            <a:ext cx="11560629" cy="2585323"/>
-          </a:xfrm>
-          <a:prstGeom prst="rect">
-            <a:avLst/>
-          </a:prstGeom>
-          <a:noFill/>
-        </p:spPr>
-        <p:txBody>
-          <a:bodyPr wrap="square" rtlCol="0">
-            <a:spAutoFit/>
-          </a:bodyPr>
-          <a:lstStyle/>
-          <a:p>
-            <a:r>
-              <a:rPr lang="fr-FR" dirty="0"/>
-              <a:t>*Min AIC =</a:t>
-            </a:r>
-            <a:r>
-              <a:rPr lang="fr-FR" dirty="0">
-                <a:solidFill>
-                  <a:srgbClr val="FF0000"/>
-                </a:solidFill>
-              </a:rPr>
-              <a:t> 3789.44</a:t>
-            </a:r>
-            <a:r>
-              <a:rPr lang="fr-FR" dirty="0"/>
-              <a:t> (en même temps on ne fait qu’un seul calcul de </a:t>
-            </a:r>
-            <a:r>
-              <a:rPr lang="fr-FR" dirty="0" err="1"/>
-              <a:t>likelihood</a:t>
-            </a:r>
-            <a:r>
-              <a:rPr lang="fr-FR" dirty="0"/>
-              <a:t>…)</a:t>
-            </a:r>
-          </a:p>
-          <a:p>
-            <a:endParaRPr lang="fr-FR" dirty="0"/>
-          </a:p>
-          <a:p>
-            <a:endParaRPr lang="fr-FR" dirty="0"/>
-          </a:p>
-          <a:p>
-            <a:endParaRPr lang="fr-FR" dirty="0"/>
-          </a:p>
-          <a:p>
-            <a:endParaRPr lang="fr-FR" dirty="0"/>
-          </a:p>
-          <a:p>
-            <a:endParaRPr lang="fr-FR" dirty="0"/>
-          </a:p>
-          <a:p>
-            <a:endParaRPr lang="fr-FR" dirty="0"/>
-          </a:p>
-          <a:p>
-            <a:endParaRPr lang="fr-FR" dirty="0"/>
-          </a:p>
-          <a:p>
-            <a:r>
-              <a:rPr lang="fr-FR" dirty="0"/>
-              <a:t>		</a:t>
-            </a:r>
-          </a:p>
-        </p:txBody>
-      </p:sp>
-      <p:pic>
-        <p:nvPicPr>
-          <p:cNvPr id="3" name="Image 2">
+          <p:cNvSpPr>
+            <a:spLocks noGrp="1"/>
+          </p:cNvSpPr>
+          <p:nvPr>
+            <p:ph type="subTitle" idx="1"/>
+          </p:nvPr>
+        </p:nvSpPr>
+        <p:spPr/>
+        <p:txBody>
+          <a:bodyPr/>
+          <a:lstStyle/>
+          <a:p>
+            <a:endParaRPr lang="fr-FR"/>
+          </a:p>
+        </p:txBody>
+      </p:sp>
+      <p:sp>
+        <p:nvSpPr>
+          <p:cNvPr id="4" name="Titre 1">
             <a:extLst>
               <a:ext uri="{FF2B5EF4-FFF2-40B4-BE49-F238E27FC236}">
-                <a16:creationId xmlns:a16="http://schemas.microsoft.com/office/drawing/2014/main" id="{FCF62DA5-13A0-B657-23DD-50EAC5BC44B6}"/>
+                <a16:creationId xmlns:a16="http://schemas.microsoft.com/office/drawing/2014/main" id="{52A1108C-5128-8BB8-4B8B-F5C36EDF8E66}"/>
               </a:ext>
             </a:extLst>
           </p:cNvPr>
-          <p:cNvPicPr>
-            <a:picLocks noChangeAspect="1"/>
-          </p:cNvPicPr>
-          <p:nvPr/>
-        </p:nvPicPr>
-        <p:blipFill>
-          <a:blip r:embed="rId2"/>
-          <a:stretch>
-            <a:fillRect/>
-          </a:stretch>
-        </p:blipFill>
+          <p:cNvSpPr>
+            <a:spLocks noGrp="1"/>
+          </p:cNvSpPr>
+          <p:nvPr>
+            <p:ph type="ctrTitle"/>
+          </p:nvPr>
+        </p:nvSpPr>
         <p:spPr>
           <a:xfrm>
-            <a:off x="1119275" y="941344"/>
-            <a:ext cx="10195648" cy="5418328"/>
+            <a:off x="1524000" y="1713679"/>
+            <a:ext cx="10327689" cy="1780635"/>
           </a:xfrm>
-          <a:prstGeom prst="rect">
-            <a:avLst/>
-          </a:prstGeom>
         </p:spPr>
-      </p:pic>
+        <p:txBody>
+          <a:bodyPr>
+            <a:normAutofit fontScale="90000"/>
+          </a:bodyPr>
+          <a:lstStyle/>
+          <a:p>
+            <a:pPr algn="l"/>
+            <a:r>
+              <a:rPr lang="fr-FR" sz="4800" dirty="0"/>
+              <a:t>*Luminosité intrinsèque inchangée</a:t>
+            </a:r>
+            <a:br>
+              <a:rPr lang="fr-FR" sz="4800" dirty="0"/>
+            </a:br>
+            <a:r>
+              <a:rPr lang="fr-FR" sz="4800" dirty="0"/>
+              <a:t>*Flat LCDM modifié : (1+</a:t>
+            </a:r>
+            <a:r>
+              <a:rPr lang="el-GR" sz="4800" dirty="0"/>
+              <a:t>α</a:t>
+            </a:r>
+            <a:r>
+              <a:rPr lang="fr-FR" sz="4800" dirty="0"/>
+              <a:t>a) avec </a:t>
+            </a:r>
+            <a:r>
+              <a:rPr lang="el-GR" sz="4800" dirty="0"/>
+              <a:t>α</a:t>
+            </a:r>
+            <a:r>
+              <a:rPr lang="fr-FR" sz="4800" dirty="0"/>
+              <a:t> souhaité à 0,18 </a:t>
+            </a:r>
+          </a:p>
+        </p:txBody>
+      </p:sp>
     </p:spTree>
     <p:extLst>
       <p:ext uri="{BB962C8B-B14F-4D97-AF65-F5344CB8AC3E}">
-        <p14:creationId xmlns:p14="http://schemas.microsoft.com/office/powerpoint/2010/main" val="2638830444"/>
+        <p14:creationId xmlns:p14="http://schemas.microsoft.com/office/powerpoint/2010/main" val="851162848"/>
       </p:ext>
     </p:extLst>
   </p:cSld>

</xml_diff>